<commit_message>
desafio 2 - ajustes finais
</commit_message>
<xml_diff>
--- a/Desafio1.zip_expanded/Desafio1_MoviePoc/MoviesPresentation.pptx
+++ b/Desafio1.zip_expanded/Desafio1_MoviePoc/MoviesPresentation.pptx
@@ -10,6 +10,7 @@
     <p:sldId id="258" r:id="rId8"/>
     <p:sldId id="259" r:id="rId9"/>
     <p:sldId id="260" r:id="rId10"/>
+    <p:sldId id="261" r:id="rId11"/>
   </p:sldIdLst>
   <p:sldSz cx="9144000" cy="6858000" type="screen4x3"/>
   <p:notesSz cx="6858000" cy="9144000"/>
@@ -3103,7 +3104,7 @@
           <a:p>
             <a:r>
               <a:rPr lang="en-US" sz="4000" b="true"/>
-              <a:t>Filmes com a participação do Realizador James Cameron</a:t>
+              <a:t>Filmes com a participação do Ator angelina jolie</a:t>
             </a:r>
             <a:br>
               <a:rPr lang="en-US" sz="4000" b="true"/>
@@ -3176,21 +3177,21 @@
           <a:p>
             <a:r>
               <a:rPr lang="en-US"/>
-              <a:t>Filme: Avatar</a:t>
+              <a:t>Filme: Maleficent</a:t>
             </a:r>
             <a:br>
               <a:rPr lang="en-US"/>
             </a:br>
             <a:r>
               <a:rPr lang="en-US"/>
-              <a:t>Realizadores: </a:t>
+              <a:t>Realizadores: Robert Stromberg</a:t>
             </a:r>
             <a:br>
               <a:rPr lang="en-US"/>
             </a:br>
             <a:r>
               <a:rPr lang="en-US"/>
-              <a:t>Ano de lançamento: 2009</a:t>
+              <a:t>Ano de lançamento: 2014</a:t>
             </a:r>
             <a:br>
               <a:rPr lang="en-US"/>
@@ -3263,21 +3264,21 @@
           <a:p>
             <a:r>
               <a:rPr lang="en-US"/>
-              <a:t>Filme: Titanic</a:t>
+              <a:t>Filme: Kung Fu Panda</a:t>
             </a:r>
             <a:br>
               <a:rPr lang="en-US"/>
             </a:br>
             <a:r>
               <a:rPr lang="en-US"/>
-              <a:t>Realizadores: cenas, James Cameron</a:t>
+              <a:t>Realizadores: John Stevenson, Mark Osborne</a:t>
             </a:r>
             <a:br>
               <a:rPr lang="en-US"/>
             </a:br>
             <a:r>
               <a:rPr lang="en-US"/>
-              <a:t>Ano de lançamento: 1997</a:t>
+              <a:t>Ano de lançamento: 2008</a:t>
             </a:r>
             <a:br>
               <a:rPr lang="en-US"/>
@@ -3350,21 +3351,21 @@
           <a:p>
             <a:r>
               <a:rPr lang="en-US"/>
-              <a:t>Filme: The Terminator</a:t>
+              <a:t>Filme: Mr. &amp; Mrs. Smith</a:t>
             </a:r>
             <a:br>
               <a:rPr lang="en-US"/>
             </a:br>
             <a:r>
               <a:rPr lang="en-US"/>
-              <a:t>Realizadores: </a:t>
+              <a:t>Realizadores: Doug Liman</a:t>
             </a:r>
             <a:br>
               <a:rPr lang="en-US"/>
             </a:br>
             <a:r>
               <a:rPr lang="en-US"/>
-              <a:t>Ano de lançamento: 1984</a:t>
+              <a:t>Ano de lançamento: 2005</a:t>
             </a:r>
             <a:br>
               <a:rPr lang="en-US"/>
@@ -3437,21 +3438,108 @@
           <a:p>
             <a:r>
               <a:rPr lang="en-US"/>
-              <a:t>Filme: Crossroads</a:t>
+              <a:t>Filme: By The Sea</a:t>
             </a:r>
             <a:br>
               <a:rPr lang="en-US"/>
             </a:br>
             <a:r>
               <a:rPr lang="en-US"/>
-              <a:t>Realizadores: Tamra Davis</a:t>
+              <a:t>Realizadores: Angelina Jolie</a:t>
             </a:r>
             <a:br>
               <a:rPr lang="en-US"/>
             </a:br>
             <a:r>
               <a:rPr lang="en-US"/>
-              <a:t>Ano de lançamento: 2002</a:t>
+              <a:t>Ano de lançamento: 2015</a:t>
+            </a:r>
+            <a:br>
+              <a:rPr lang="en-US"/>
+            </a:br>
+          </a:p>
+        </p:txBody>
+      </p:sp>
+    </p:spTree>
+  </p:cSld>
+  <p:clrMapOvr>
+    <a:masterClrMapping/>
+  </p:clrMapOvr>
+</p:sld>
+</file>
+
+<file path=ppt/slides/slide6.xml><?xml version="1.0" encoding="utf-8"?>
+<p:sld xmlns:p="http://schemas.openxmlformats.org/presentationml/2006/main" xmlns:a="http://schemas.openxmlformats.org/drawingml/2006/main">
+  <p:cSld>
+    <p:spTree>
+      <p:nvGrpSpPr>
+        <p:cNvPr id="1" name=""/>
+        <p:cNvGrpSpPr/>
+        <p:nvPr/>
+      </p:nvGrpSpPr>
+      <p:grpSpPr>
+        <a:xfrm>
+          <a:off x="0" y="0"/>
+          <a:ext cx="0" cy="0"/>
+          <a:chOff x="0" y="0"/>
+          <a:chExt cx="0" cy="0"/>
+        </a:xfrm>
+      </p:grpSpPr>
+      <p:sp xmlns:r="http://schemas.openxmlformats.org/officeDocument/2006/relationships">
+        <p:nvSpPr>
+          <p:cNvPr id="2" name="Title 1"/>
+          <p:cNvSpPr>
+            <a:spLocks noGrp="1"/>
+          </p:cNvSpPr>
+          <p:nvPr>
+            <p:ph type="title"/>
+          </p:nvPr>
+        </p:nvSpPr>
+        <p:spPr/>
+        <p:txBody>
+          <a:bodyPr/>
+          <a:lstStyle/>
+          <a:p>
+            <a:r>
+              <a:rPr lang="en-US" smtClean="0"/>
+              <a:t>Click to edit Master title style</a:t>
+            </a:r>
+            <a:endParaRPr lang="en-US"/>
+          </a:p>
+        </p:txBody>
+      </p:sp>
+      <p:sp xmlns:r="http://schemas.openxmlformats.org/officeDocument/2006/relationships">
+        <p:nvSpPr>
+          <p:cNvPr id="3" name="Content Placeholder 2"/>
+          <p:cNvSpPr>
+            <a:spLocks noGrp="1"/>
+          </p:cNvSpPr>
+          <p:nvPr>
+            <p:ph idx="1"/>
+          </p:nvPr>
+        </p:nvSpPr>
+        <p:spPr/>
+        <p:txBody>
+          <a:bodyPr/>
+          <a:lstStyle/>
+          <a:p>
+            <a:r>
+              <a:rPr lang="en-US"/>
+              <a:t>Filme: Lara Croft: Tomb Raider</a:t>
+            </a:r>
+            <a:br>
+              <a:rPr lang="en-US"/>
+            </a:br>
+            <a:r>
+              <a:rPr lang="en-US"/>
+              <a:t>Realizadores: Simon West</a:t>
+            </a:r>
+            <a:br>
+              <a:rPr lang="en-US"/>
+            </a:br>
+            <a:r>
+              <a:rPr lang="en-US"/>
+              <a:t>Ano de lançamento: 2001</a:t>
             </a:r>
             <a:br>
               <a:rPr lang="en-US"/>

</xml_diff>